<commit_message>
Gestion projet et amélioration
</commit_message>
<xml_diff>
--- a/Gestion de projet/Présentation semaine 2.pptx
+++ b/Gestion de projet/Présentation semaine 2.pptx
@@ -7906,8 +7906,13 @@
             </a:r>
             <a:r>
               <a:rPr lang="fr-FR" sz="1600" b="1" dirty="0"/>
-              <a:t>organise les données qui se trouvent à l’intérieur du Data Warehouse pour les analyser</a:t>
-            </a:r>
+              <a:t>organise les données qui se trouvent à l’intérieur du Data Warehouse pour </a:t>
+            </a:r>
+            <a:r>
+              <a:rPr lang="fr-FR" sz="1600" b="1"/>
+              <a:t>les classer</a:t>
+            </a:r>
+            <a:endParaRPr lang="fr-FR" sz="1600" b="1" dirty="0"/>
           </a:p>
           <a:p>
             <a:endParaRPr lang="fr-FR" b="1" dirty="0"/>
@@ -8337,39 +8342,129 @@
         </p:nvSpPr>
         <p:spPr>
           <a:xfrm>
-            <a:off x="762000" y="2409824"/>
-            <a:ext cx="10668000" cy="3048001"/>
+            <a:off x="881062" y="4285475"/>
+            <a:ext cx="10668000" cy="1962150"/>
           </a:xfrm>
         </p:spPr>
         <p:txBody>
-          <a:bodyPr/>
+          <a:bodyPr>
+            <a:normAutofit fontScale="77500" lnSpcReduction="20000"/>
+          </a:bodyPr>
           <a:lstStyle/>
           <a:p>
+            <a:pPr marL="0" indent="0">
+              <a:buNone/>
+            </a:pPr>
+            <a:r>
+              <a:rPr lang="fr-FR" sz="3100" dirty="0">
+                <a:solidFill>
+                  <a:srgbClr val="FF0000"/>
+                </a:solidFill>
+              </a:rPr>
+              <a:t>Appropriation des données </a:t>
+            </a:r>
+            <a:r>
+              <a:rPr lang="fr-FR" sz="2600" dirty="0">
+                <a:solidFill>
+                  <a:srgbClr val="FF0000"/>
+                </a:solidFill>
+              </a:rPr>
+              <a:t>:</a:t>
+            </a:r>
+          </a:p>
+          <a:p>
+            <a:pPr marL="0" indent="0">
+              <a:buNone/>
+            </a:pPr>
+            <a:endParaRPr lang="fr-FR" sz="1800" dirty="0">
+              <a:solidFill>
+                <a:srgbClr val="FF0000"/>
+              </a:solidFill>
+            </a:endParaRPr>
+          </a:p>
+          <a:p>
+            <a:r>
+              <a:rPr lang="fr-FR" sz="2300" dirty="0"/>
+              <a:t>Extraction des premiers jeux de données pour l’analyse descriptive</a:t>
+            </a:r>
+          </a:p>
+          <a:p>
+            <a:r>
+              <a:rPr lang="fr-FR" sz="2300" dirty="0"/>
+              <a:t>Mise en ligne sur notre espace de travail (GitHub) afin que tout le monde ait l’accès </a:t>
+            </a:r>
+          </a:p>
+          <a:p>
+            <a:r>
+              <a:rPr lang="fr-FR" sz="2300" dirty="0"/>
+              <a:t>Début du travail sur l’analyse globale des données </a:t>
+            </a:r>
+          </a:p>
+          <a:p>
+            <a:r>
+              <a:rPr lang="fr-FR" sz="2300" dirty="0"/>
+              <a:t>Etude des notebooks concernant la Formule 1 </a:t>
+            </a:r>
+          </a:p>
+          <a:p>
+            <a:endParaRPr lang="fr-FR" dirty="0"/>
+          </a:p>
+        </p:txBody>
+      </p:sp>
+      <p:sp>
+        <p:nvSpPr>
+          <p:cNvPr id="4" name="ZoneTexte 3">
+            <a:extLst>
+              <a:ext uri="{FF2B5EF4-FFF2-40B4-BE49-F238E27FC236}">
+                <a16:creationId xmlns:a16="http://schemas.microsoft.com/office/drawing/2014/main" id="{F89C0CFB-2C7A-4FEB-9490-7C65F05DF71C}"/>
+              </a:ext>
+            </a:extLst>
+          </p:cNvPr>
+          <p:cNvSpPr txBox="1"/>
+          <p:nvPr/>
+        </p:nvSpPr>
+        <p:spPr>
+          <a:xfrm>
+            <a:off x="881062" y="1933396"/>
+            <a:ext cx="9877425" cy="2123658"/>
+          </a:xfrm>
+          <a:prstGeom prst="rect">
+            <a:avLst/>
+          </a:prstGeom>
+          <a:noFill/>
+        </p:spPr>
+        <p:txBody>
+          <a:bodyPr wrap="square" rtlCol="0">
+            <a:spAutoFit/>
+          </a:bodyPr>
+          <a:lstStyle/>
+          <a:p>
+            <a:r>
+              <a:rPr lang="fr-FR" sz="2400" dirty="0">
+                <a:solidFill>
+                  <a:srgbClr val="FF0000"/>
+                </a:solidFill>
+              </a:rPr>
+              <a:t>Définir l’objectif : </a:t>
+            </a:r>
+          </a:p>
+          <a:p>
+            <a:endParaRPr lang="fr-FR" dirty="0"/>
+          </a:p>
+          <a:p>
             <a:r>
               <a:rPr lang="fr-FR" dirty="0"/>
-              <a:t>Extraction des premiers jeux de données pour l’analyse descriptive</a:t>
-            </a:r>
+              <a:t>Entreprise : étude des meilleures écuries et des pilotes pour déterminer la probabilité qu’il gagne selon les conditions de courses.</a:t>
+            </a:r>
+          </a:p>
+          <a:p>
+            <a:endParaRPr lang="fr-FR" dirty="0"/>
           </a:p>
           <a:p>
             <a:r>
               <a:rPr lang="fr-FR" dirty="0"/>
-              <a:t>Mise en ligne sur notre espace de travail (GitHub) afin que tout le monde ait l’accès </a:t>
-            </a:r>
-          </a:p>
-          <a:p>
-            <a:r>
-              <a:rPr lang="fr-FR" dirty="0"/>
-              <a:t>Début du travail sur l’analyse globale des données </a:t>
-            </a:r>
-          </a:p>
-          <a:p>
-            <a:r>
-              <a:rPr lang="fr-FR" dirty="0"/>
-              <a:t>Etude des notebooks concernant la Formule 1 </a:t>
-            </a:r>
-          </a:p>
-          <a:p>
-            <a:endParaRPr lang="fr-FR" dirty="0"/>
+              <a:t>A qui est destiné le service : On revend les études et les analyses prédictives aux :  bookmakers, écuries, particuliers (parieurs)</a:t>
+            </a:r>
           </a:p>
         </p:txBody>
       </p:sp>
@@ -8899,6 +8994,15 @@
 </file>
 
 <file path=customXml/item1.xml><?xml version="1.0" encoding="utf-8"?>
+<?mso-contentType ?>
+<FormTemplates xmlns="http://schemas.microsoft.com/sharepoint/v3/contenttype/forms">
+  <Display>DocumentLibraryForm</Display>
+  <Edit>DocumentLibraryForm</Edit>
+  <New>DocumentLibraryForm</New>
+</FormTemplates>
+</file>
+
+<file path=customXml/item2.xml><?xml version="1.0" encoding="utf-8"?>
 <ct:contentTypeSchema xmlns:ct="http://schemas.microsoft.com/office/2006/metadata/contentType" xmlns:ma="http://schemas.microsoft.com/office/2006/metadata/properties/metaAttributes" ct:_="" ma:_="" ma:contentTypeName="Document" ma:contentTypeID="0x010100F91CA58AEA67DE46B8842B73E9BA612D" ma:contentTypeVersion="11" ma:contentTypeDescription="Crée un document." ma:contentTypeScope="" ma:versionID="a9fb925ac88f6f75396dc2d054661b1d">
   <xsd:schema xmlns:xsd="http://www.w3.org/2001/XMLSchema" xmlns:xs="http://www.w3.org/2001/XMLSchema" xmlns:p="http://schemas.microsoft.com/office/2006/metadata/properties" xmlns:ns3="c3d0b6cf-9588-47cf-a0bc-cf1957bdb512" xmlns:ns4="514b1ae2-3eed-4298-a95d-bd37742bc99c" targetNamespace="http://schemas.microsoft.com/office/2006/metadata/properties" ma:root="true" ma:fieldsID="a4b4deb9d201fd1586da5e3a26dd47a6" ns3:_="" ns4:_="">
     <xsd:import namespace="c3d0b6cf-9588-47cf-a0bc-cf1957bdb512"/>
@@ -9109,15 +9213,6 @@
 </ct:contentTypeSchema>
 </file>
 
-<file path=customXml/item2.xml><?xml version="1.0" encoding="utf-8"?>
-<?mso-contentType ?>
-<FormTemplates xmlns="http://schemas.microsoft.com/sharepoint/v3/contenttype/forms">
-  <Display>DocumentLibraryForm</Display>
-  <Edit>DocumentLibraryForm</Edit>
-  <New>DocumentLibraryForm</New>
-</FormTemplates>
-</file>
-
 <file path=customXml/item3.xml><?xml version="1.0" encoding="utf-8"?>
 <p:properties xmlns:p="http://schemas.microsoft.com/office/2006/metadata/properties" xmlns:xsi="http://www.w3.org/2001/XMLSchema-instance" xmlns:pc="http://schemas.microsoft.com/office/infopath/2007/PartnerControls">
   <documentManagement/>
@@ -9125,6 +9220,14 @@
 </file>
 
 <file path=customXml/itemProps1.xml><?xml version="1.0" encoding="utf-8"?>
+<ds:datastoreItem xmlns:ds="http://schemas.openxmlformats.org/officeDocument/2006/customXml" ds:itemID="{53CC9305-FEE6-4A65-BC1A-C2E65F6DE93B}">
+  <ds:schemaRefs>
+    <ds:schemaRef ds:uri="http://schemas.microsoft.com/sharepoint/v3/contenttype/forms"/>
+  </ds:schemaRefs>
+</ds:datastoreItem>
+</file>
+
+<file path=customXml/itemProps2.xml><?xml version="1.0" encoding="utf-8"?>
 <ds:datastoreItem xmlns:ds="http://schemas.openxmlformats.org/officeDocument/2006/customXml" ds:itemID="{93CBACE0-89BA-4A4D-838C-B101B4435DE1}">
   <ds:schemaRefs>
     <ds:schemaRef ds:uri="http://schemas.microsoft.com/office/2006/metadata/contentType"/>
@@ -9139,14 +9242,6 @@
     <ds:schemaRef ds:uri="http://purl.org/dc/elements/1.1/"/>
     <ds:schemaRef ds:uri="http://purl.org/dc/terms/"/>
     <ds:schemaRef ds:uri="http://schemas.microsoft.com/internal/obd"/>
-  </ds:schemaRefs>
-</ds:datastoreItem>
-</file>
-
-<file path=customXml/itemProps2.xml><?xml version="1.0" encoding="utf-8"?>
-<ds:datastoreItem xmlns:ds="http://schemas.openxmlformats.org/officeDocument/2006/customXml" ds:itemID="{53CC9305-FEE6-4A65-BC1A-C2E65F6DE93B}">
-  <ds:schemaRefs>
-    <ds:schemaRef ds:uri="http://schemas.microsoft.com/sharepoint/v3/contenttype/forms"/>
   </ds:schemaRefs>
 </ds:datastoreItem>
 </file>

</xml_diff>